<commit_message>
Update Student Performance Summary & Review.pptx
</commit_message>
<xml_diff>
--- a/Student Performance Portfolio/Student Performance Summary & Review.pptx
+++ b/Student Performance Portfolio/Student Performance Summary & Review.pptx
@@ -3515,7 +3515,7 @@
           <a:p>
             <a:fld id="{C128FA71-3A18-48C0-980F-4B68F7F63042}" type="datetime1">
               <a:rPr lang="en-US" smtClean="0"/>
-              <a:t>7/16/2025</a:t>
+              <a:t>7/24/2025</a:t>
             </a:fld>
             <a:endParaRPr lang="en-US"/>
           </a:p>
@@ -3723,7 +3723,7 @@
           <a:p>
             <a:fld id="{7104EDB3-C0E8-45F8-9E1D-1B6C8D1880C0}" type="datetime1">
               <a:rPr lang="en-US" smtClean="0"/>
-              <a:t>7/16/2025</a:t>
+              <a:t>7/24/2025</a:t>
             </a:fld>
             <a:endParaRPr lang="en-US"/>
           </a:p>
@@ -3933,7 +3933,7 @@
           <a:p>
             <a:fld id="{9CF0EC4B-54ED-4041-B552-9BA760FA3DBA}" type="datetime1">
               <a:rPr lang="en-US" smtClean="0"/>
-              <a:t>7/16/2025</a:t>
+              <a:t>7/24/2025</a:t>
             </a:fld>
             <a:endParaRPr lang="en-US"/>
           </a:p>
@@ -4131,7 +4131,7 @@
           <a:p>
             <a:fld id="{51C1210E-201E-4473-82AC-2466F5386C38}" type="datetime1">
               <a:rPr lang="en-US" smtClean="0"/>
-              <a:t>7/16/2025</a:t>
+              <a:t>7/24/2025</a:t>
             </a:fld>
             <a:endParaRPr lang="en-US"/>
           </a:p>
@@ -4409,7 +4409,7 @@
           <a:p>
             <a:fld id="{B01EA198-6CAB-4B8F-B93F-1F9C8C4B6CE7}" type="datetime1">
               <a:rPr lang="en-US" smtClean="0"/>
-              <a:t>7/16/2025</a:t>
+              <a:t>7/24/2025</a:t>
             </a:fld>
             <a:endParaRPr lang="en-US"/>
           </a:p>
@@ -4681,7 +4681,7 @@
           <a:p>
             <a:fld id="{CA06041F-4525-44D5-AA4F-332294BF1F56}" type="datetime1">
               <a:rPr lang="en-US" smtClean="0"/>
-              <a:t>7/16/2025</a:t>
+              <a:t>7/24/2025</a:t>
             </a:fld>
             <a:endParaRPr lang="en-US"/>
           </a:p>
@@ -5105,7 +5105,7 @@
           <a:p>
             <a:fld id="{F9557091-BBDF-4EB9-BA6B-2BB67AC4FC0F}" type="datetime1">
               <a:rPr lang="en-US" smtClean="0"/>
-              <a:t>7/16/2025</a:t>
+              <a:t>7/24/2025</a:t>
             </a:fld>
             <a:endParaRPr lang="en-US"/>
           </a:p>
@@ -5246,7 +5246,7 @@
           <a:p>
             <a:fld id="{2D6B226B-77A6-410C-9796-083F278E0125}" type="datetime1">
               <a:rPr lang="en-US" smtClean="0"/>
-              <a:t>7/16/2025</a:t>
+              <a:t>7/24/2025</a:t>
             </a:fld>
             <a:endParaRPr lang="en-US"/>
           </a:p>
@@ -5359,7 +5359,7 @@
           <a:p>
             <a:fld id="{A23A578B-D289-4C40-8593-3D356C49DA58}" type="datetime1">
               <a:rPr lang="en-US" smtClean="0"/>
-              <a:t>7/16/2025</a:t>
+              <a:t>7/24/2025</a:t>
             </a:fld>
             <a:endParaRPr lang="en-US"/>
           </a:p>
@@ -5678,7 +5678,7 @@
           <a:p>
             <a:fld id="{713DFAE3-14DB-48A7-A80F-80DDB072CE3D}" type="datetime1">
               <a:rPr lang="en-US" smtClean="0"/>
-              <a:t>7/16/2025</a:t>
+              <a:t>7/24/2025</a:t>
             </a:fld>
             <a:endParaRPr lang="en-US"/>
           </a:p>
@@ -5972,7 +5972,7 @@
           <a:p>
             <a:fld id="{92C5EAEF-6478-4102-8F5D-A5FE9FC97ACB}" type="datetime1">
               <a:rPr lang="en-US" smtClean="0"/>
-              <a:t>7/16/2025</a:t>
+              <a:t>7/24/2025</a:t>
             </a:fld>
             <a:endParaRPr lang="en-US"/>
           </a:p>
@@ -6213,7 +6213,7 @@
           <a:p>
             <a:fld id="{67F45AC6-C491-4585-A584-9CE2AF7D5500}" type="datetime1">
               <a:rPr lang="en-US" smtClean="0"/>
-              <a:t>7/16/2025</a:t>
+              <a:t>7/24/2025</a:t>
             </a:fld>
             <a:endParaRPr lang="en-US"/>
           </a:p>
@@ -7436,7 +7436,7 @@
         </p:blipFill>
         <p:spPr>
           <a:xfrm>
-            <a:off x="400327" y="481656"/>
+            <a:off x="301715" y="481656"/>
             <a:ext cx="11391346" cy="6376344"/>
           </a:xfrm>
         </p:spPr>
@@ -7609,8 +7609,8 @@
         </p:nvSpPr>
         <p:spPr>
           <a:xfrm>
-            <a:off x="277401" y="708917"/>
-            <a:ext cx="9205646" cy="5876818"/>
+            <a:off x="89647" y="708917"/>
+            <a:ext cx="9475694" cy="5876818"/>
           </a:xfrm>
         </p:spPr>
         <p:txBody>
@@ -8192,8 +8192,8 @@
         </p:nvSpPr>
         <p:spPr>
           <a:xfrm>
-            <a:off x="4767209" y="548637"/>
-            <a:ext cx="7335748" cy="6183355"/>
+            <a:off x="4750616" y="557601"/>
+            <a:ext cx="7441384" cy="6201787"/>
           </a:xfrm>
         </p:spPr>
         <p:txBody>
@@ -8281,7 +8281,7 @@
             </a:pPr>
             <a:r>
               <a:rPr lang="en-GB" sz="1600" dirty="0"/>
-              <a:t>•Educate parents, especially those without higher education, on how to support learning at home.</a:t>
+              <a:t>Educate parents, especially those without higher education, on how to support learning at home.</a:t>
             </a:r>
           </a:p>
           <a:p>

</xml_diff>